<commit_message>
Uploaded models to Chapter 11
</commit_message>
<xml_diff>
--- a/Chapter11-AlternativeModellingApproaches/Chapter11.pptx
+++ b/Chapter11-AlternativeModellingApproaches/Chapter11.pptx
@@ -5,7 +5,7 @@
     <p:sldMasterId id="2147483648" r:id="rId1"/>
   </p:sldMasterIdLst>
   <p:notesMasterIdLst>
-    <p:notesMasterId r:id="rId18"/>
+    <p:notesMasterId r:id="rId27"/>
   </p:notesMasterIdLst>
   <p:sldIdLst>
     <p:sldId id="256" r:id="rId2"/>
@@ -24,6 +24,15 @@
     <p:sldId id="269" r:id="rId15"/>
     <p:sldId id="270" r:id="rId16"/>
     <p:sldId id="271" r:id="rId17"/>
+    <p:sldId id="272" r:id="rId18"/>
+    <p:sldId id="273" r:id="rId19"/>
+    <p:sldId id="274" r:id="rId20"/>
+    <p:sldId id="276" r:id="rId21"/>
+    <p:sldId id="277" r:id="rId22"/>
+    <p:sldId id="278" r:id="rId23"/>
+    <p:sldId id="279" r:id="rId24"/>
+    <p:sldId id="280" r:id="rId25"/>
+    <p:sldId id="275" r:id="rId26"/>
   </p:sldIdLst>
   <p:sldSz cx="12192000" cy="6858000"/>
   <p:notesSz cx="6858000" cy="9144000"/>
@@ -652,6 +661,185 @@
     <p:extLst>
       <p:ext uri="{BB962C8B-B14F-4D97-AF65-F5344CB8AC3E}">
         <p14:creationId xmlns:p14="http://schemas.microsoft.com/office/powerpoint/2010/main" val="2035646072"/>
+      </p:ext>
+    </p:extLst>
+  </p:cSld>
+  <p:clrMapOvr>
+    <a:masterClrMapping/>
+  </p:clrMapOvr>
+</p:notes>
+</file>
+
+<file path=ppt/notesSlides/notesSlide3.xml><?xml version="1.0" encoding="utf-8"?>
+<p:notes xmlns:a="http://schemas.openxmlformats.org/drawingml/2006/main" xmlns:r="http://schemas.openxmlformats.org/officeDocument/2006/relationships" xmlns:p="http://schemas.openxmlformats.org/presentationml/2006/main">
+  <p:cSld>
+    <p:spTree>
+      <p:nvGrpSpPr>
+        <p:cNvPr id="1" name=""/>
+        <p:cNvGrpSpPr/>
+        <p:nvPr/>
+      </p:nvGrpSpPr>
+      <p:grpSpPr>
+        <a:xfrm>
+          <a:off x="0" y="0"/>
+          <a:ext cx="0" cy="0"/>
+          <a:chOff x="0" y="0"/>
+          <a:chExt cx="0" cy="0"/>
+        </a:xfrm>
+      </p:grpSpPr>
+      <p:sp>
+        <p:nvSpPr>
+          <p:cNvPr id="2" name="Slide Image Placeholder 1"/>
+          <p:cNvSpPr>
+            <a:spLocks noGrp="1" noRot="1" noChangeAspect="1"/>
+          </p:cNvSpPr>
+          <p:nvPr>
+            <p:ph type="sldImg"/>
+          </p:nvPr>
+        </p:nvSpPr>
+        <p:spPr/>
+      </p:sp>
+      <p:sp>
+        <p:nvSpPr>
+          <p:cNvPr id="3" name="Notes Placeholder 2"/>
+          <p:cNvSpPr>
+            <a:spLocks noGrp="1"/>
+          </p:cNvSpPr>
+          <p:nvPr>
+            <p:ph type="body" idx="1"/>
+          </p:nvPr>
+        </p:nvSpPr>
+        <p:spPr/>
+        <p:txBody>
+          <a:bodyPr/>
+          <a:lstStyle/>
+          <a:p>
+            <a:endParaRPr lang="en-US" dirty="0"/>
+          </a:p>
+        </p:txBody>
+      </p:sp>
+      <p:sp>
+        <p:nvSpPr>
+          <p:cNvPr id="4" name="Slide Number Placeholder 3"/>
+          <p:cNvSpPr>
+            <a:spLocks noGrp="1"/>
+          </p:cNvSpPr>
+          <p:nvPr>
+            <p:ph type="sldNum" sz="quarter" idx="10"/>
+          </p:nvPr>
+        </p:nvSpPr>
+        <p:spPr/>
+        <p:txBody>
+          <a:bodyPr/>
+          <a:lstStyle/>
+          <a:p>
+            <a:fld id="{D0AC5D2E-38EA-0243-B2EF-AD7634BE96D8}" type="slidenum">
+              <a:rPr lang="en-US" smtClean="0"/>
+              <a:t>21</a:t>
+            </a:fld>
+            <a:endParaRPr lang="en-US"/>
+          </a:p>
+        </p:txBody>
+      </p:sp>
+    </p:spTree>
+    <p:extLst>
+      <p:ext uri="{BB962C8B-B14F-4D97-AF65-F5344CB8AC3E}">
+        <p14:creationId xmlns:p14="http://schemas.microsoft.com/office/powerpoint/2010/main" val="1409961349"/>
+      </p:ext>
+    </p:extLst>
+  </p:cSld>
+  <p:clrMapOvr>
+    <a:masterClrMapping/>
+  </p:clrMapOvr>
+</p:notes>
+</file>
+
+<file path=ppt/notesSlides/notesSlide4.xml><?xml version="1.0" encoding="utf-8"?>
+<p:notes xmlns:a="http://schemas.openxmlformats.org/drawingml/2006/main" xmlns:r="http://schemas.openxmlformats.org/officeDocument/2006/relationships" xmlns:p="http://schemas.openxmlformats.org/presentationml/2006/main">
+  <p:cSld>
+    <p:spTree>
+      <p:nvGrpSpPr>
+        <p:cNvPr id="1" name=""/>
+        <p:cNvGrpSpPr/>
+        <p:nvPr/>
+      </p:nvGrpSpPr>
+      <p:grpSpPr>
+        <a:xfrm>
+          <a:off x="0" y="0"/>
+          <a:ext cx="0" cy="0"/>
+          <a:chOff x="0" y="0"/>
+          <a:chExt cx="0" cy="0"/>
+        </a:xfrm>
+      </p:grpSpPr>
+      <p:sp>
+        <p:nvSpPr>
+          <p:cNvPr id="2" name="Slide Image Placeholder 1"/>
+          <p:cNvSpPr>
+            <a:spLocks noGrp="1" noRot="1" noChangeAspect="1"/>
+          </p:cNvSpPr>
+          <p:nvPr>
+            <p:ph type="sldImg"/>
+          </p:nvPr>
+        </p:nvSpPr>
+        <p:spPr/>
+      </p:sp>
+      <p:sp>
+        <p:nvSpPr>
+          <p:cNvPr id="3" name="Notes Placeholder 2"/>
+          <p:cNvSpPr>
+            <a:spLocks noGrp="1"/>
+          </p:cNvSpPr>
+          <p:nvPr>
+            <p:ph type="body" idx="1"/>
+          </p:nvPr>
+        </p:nvSpPr>
+        <p:spPr/>
+        <p:txBody>
+          <a:bodyPr/>
+          <a:lstStyle/>
+          <a:p>
+            <a:r>
+              <a:rPr lang="en-US" dirty="0"/>
+              <a:t>In this chapter agent-based models have been contrasted to other common modelling approaches used within the social sciences. The purpose of this was to give an overview of these approaches and through experimentation, to highlight their differences to agent-based modelling. In agent-based models, patterns emerge from the direct interaction of multiple heterogeneous agents from the '\</a:t>
+            </a:r>
+            <a:r>
+              <a:rPr lang="en-US" dirty="0" err="1"/>
+              <a:t>textit</a:t>
+            </a:r>
+            <a:r>
+              <a:rPr lang="en-US" dirty="0"/>
+              <a:t>{bottom up}'. In such models we have individual agents, which is not the case in SD or spatial interaction models. The use of the SIR example demonstrated that diseases do not spread via spatial diffusion (i.e. from one cell to another cell as in the CA model) but by direct agent-to-agent interaction. </a:t>
+            </a:r>
+          </a:p>
+        </p:txBody>
+      </p:sp>
+      <p:sp>
+        <p:nvSpPr>
+          <p:cNvPr id="4" name="Slide Number Placeholder 3"/>
+          <p:cNvSpPr>
+            <a:spLocks noGrp="1"/>
+          </p:cNvSpPr>
+          <p:nvPr>
+            <p:ph type="sldNum" sz="quarter" idx="10"/>
+          </p:nvPr>
+        </p:nvSpPr>
+        <p:spPr/>
+        <p:txBody>
+          <a:bodyPr/>
+          <a:lstStyle/>
+          <a:p>
+            <a:fld id="{D0AC5D2E-38EA-0243-B2EF-AD7634BE96D8}" type="slidenum">
+              <a:rPr lang="en-US" smtClean="0"/>
+              <a:t>25</a:t>
+            </a:fld>
+            <a:endParaRPr lang="en-US"/>
+          </a:p>
+        </p:txBody>
+      </p:sp>
+    </p:spTree>
+    <p:extLst>
+      <p:ext uri="{BB962C8B-B14F-4D97-AF65-F5344CB8AC3E}">
+        <p14:creationId xmlns:p14="http://schemas.microsoft.com/office/powerpoint/2010/main" val="3664827507"/>
       </p:ext>
     </p:extLst>
   </p:cSld>
@@ -4692,6 +4880,379 @@
 </p:sld>
 </file>
 
+<file path=ppt/slides/slide17.xml><?xml version="1.0" encoding="utf-8"?>
+<p:sld xmlns:a="http://schemas.openxmlformats.org/drawingml/2006/main" xmlns:r="http://schemas.openxmlformats.org/officeDocument/2006/relationships" xmlns:p="http://schemas.openxmlformats.org/presentationml/2006/main">
+  <p:cSld>
+    <p:spTree>
+      <p:nvGrpSpPr>
+        <p:cNvPr id="1" name=""/>
+        <p:cNvGrpSpPr/>
+        <p:nvPr/>
+      </p:nvGrpSpPr>
+      <p:grpSpPr>
+        <a:xfrm>
+          <a:off x="0" y="0"/>
+          <a:ext cx="0" cy="0"/>
+          <a:chOff x="0" y="0"/>
+          <a:chExt cx="0" cy="0"/>
+        </a:xfrm>
+      </p:grpSpPr>
+      <p:sp>
+        <p:nvSpPr>
+          <p:cNvPr id="2" name="Title 1">
+            <a:extLst>
+              <a:ext uri="{FF2B5EF4-FFF2-40B4-BE49-F238E27FC236}">
+                <a16:creationId xmlns:a16="http://schemas.microsoft.com/office/drawing/2014/main" id="{5F5579B9-A604-544A-925F-40FD80E08C0B}"/>
+              </a:ext>
+            </a:extLst>
+          </p:cNvPr>
+          <p:cNvSpPr>
+            <a:spLocks noGrp="1"/>
+          </p:cNvSpPr>
+          <p:nvPr>
+            <p:ph type="title"/>
+          </p:nvPr>
+        </p:nvSpPr>
+        <p:spPr/>
+        <p:txBody>
+          <a:bodyPr/>
+          <a:lstStyle/>
+          <a:p>
+            <a:r>
+              <a:rPr lang="en-US" dirty="0"/>
+              <a:t>Comparing Different Modelling Approaches</a:t>
+            </a:r>
+          </a:p>
+        </p:txBody>
+      </p:sp>
+      <p:pic>
+        <p:nvPicPr>
+          <p:cNvPr id="6" name="Content Placeholder 5">
+            <a:extLst>
+              <a:ext uri="{FF2B5EF4-FFF2-40B4-BE49-F238E27FC236}">
+                <a16:creationId xmlns:a16="http://schemas.microsoft.com/office/drawing/2014/main" id="{E89BAEB7-AA3E-2549-B5AB-C175F17B0417}"/>
+              </a:ext>
+            </a:extLst>
+          </p:cNvPr>
+          <p:cNvPicPr>
+            <a:picLocks noGrp="1" noChangeAspect="1"/>
+          </p:cNvPicPr>
+          <p:nvPr>
+            <p:ph idx="1"/>
+          </p:nvPr>
+        </p:nvPicPr>
+        <p:blipFill>
+          <a:blip r:embed="rId2"/>
+          <a:stretch>
+            <a:fillRect/>
+          </a:stretch>
+        </p:blipFill>
+        <p:spPr>
+          <a:xfrm>
+            <a:off x="838200" y="1998812"/>
+            <a:ext cx="10515600" cy="4004964"/>
+          </a:xfrm>
+        </p:spPr>
+      </p:pic>
+    </p:spTree>
+    <p:extLst>
+      <p:ext uri="{BB962C8B-B14F-4D97-AF65-F5344CB8AC3E}">
+        <p14:creationId xmlns:p14="http://schemas.microsoft.com/office/powerpoint/2010/main" val="93636519"/>
+      </p:ext>
+    </p:extLst>
+  </p:cSld>
+  <p:clrMapOvr>
+    <a:masterClrMapping/>
+  </p:clrMapOvr>
+</p:sld>
+</file>
+
+<file path=ppt/slides/slide18.xml><?xml version="1.0" encoding="utf-8"?>
+<p:sld xmlns:a="http://schemas.openxmlformats.org/drawingml/2006/main" xmlns:r="http://schemas.openxmlformats.org/officeDocument/2006/relationships" xmlns:p="http://schemas.openxmlformats.org/presentationml/2006/main">
+  <p:cSld>
+    <p:spTree>
+      <p:nvGrpSpPr>
+        <p:cNvPr id="1" name=""/>
+        <p:cNvGrpSpPr/>
+        <p:nvPr/>
+      </p:nvGrpSpPr>
+      <p:grpSpPr>
+        <a:xfrm>
+          <a:off x="0" y="0"/>
+          <a:ext cx="0" cy="0"/>
+          <a:chOff x="0" y="0"/>
+          <a:chExt cx="0" cy="0"/>
+        </a:xfrm>
+      </p:grpSpPr>
+      <p:sp>
+        <p:nvSpPr>
+          <p:cNvPr id="2" name="Title 1">
+            <a:extLst>
+              <a:ext uri="{FF2B5EF4-FFF2-40B4-BE49-F238E27FC236}">
+                <a16:creationId xmlns:a16="http://schemas.microsoft.com/office/drawing/2014/main" id="{ABA4234A-3DE8-944C-B62D-C3EC18A4A6B6}"/>
+              </a:ext>
+            </a:extLst>
+          </p:cNvPr>
+          <p:cNvSpPr>
+            <a:spLocks noGrp="1"/>
+          </p:cNvSpPr>
+          <p:nvPr>
+            <p:ph type="title"/>
+          </p:nvPr>
+        </p:nvSpPr>
+        <p:spPr/>
+        <p:txBody>
+          <a:bodyPr/>
+          <a:lstStyle/>
+          <a:p>
+            <a:r>
+              <a:rPr lang="en-US" dirty="0"/>
+              <a:t>A Practical Comparison: The SIR Model</a:t>
+            </a:r>
+          </a:p>
+        </p:txBody>
+      </p:sp>
+      <p:sp>
+        <p:nvSpPr>
+          <p:cNvPr id="3" name="Content Placeholder 2">
+            <a:extLst>
+              <a:ext uri="{FF2B5EF4-FFF2-40B4-BE49-F238E27FC236}">
+                <a16:creationId xmlns:a16="http://schemas.microsoft.com/office/drawing/2014/main" id="{97482F16-C8D1-AF41-A82B-3D9F6B79A4FE}"/>
+              </a:ext>
+            </a:extLst>
+          </p:cNvPr>
+          <p:cNvSpPr>
+            <a:spLocks noGrp="1"/>
+          </p:cNvSpPr>
+          <p:nvPr>
+            <p:ph idx="1"/>
+          </p:nvPr>
+        </p:nvSpPr>
+        <p:spPr/>
+        <p:txBody>
+          <a:bodyPr/>
+          <a:lstStyle/>
+          <a:p>
+            <a:endParaRPr lang="en-US"/>
+          </a:p>
+        </p:txBody>
+      </p:sp>
+    </p:spTree>
+    <p:extLst>
+      <p:ext uri="{BB962C8B-B14F-4D97-AF65-F5344CB8AC3E}">
+        <p14:creationId xmlns:p14="http://schemas.microsoft.com/office/powerpoint/2010/main" val="4023075973"/>
+      </p:ext>
+    </p:extLst>
+  </p:cSld>
+  <p:clrMapOvr>
+    <a:masterClrMapping/>
+  </p:clrMapOvr>
+</p:sld>
+</file>
+
+<file path=ppt/slides/slide19.xml><?xml version="1.0" encoding="utf-8"?>
+<p:sld xmlns:a="http://schemas.openxmlformats.org/drawingml/2006/main" xmlns:r="http://schemas.openxmlformats.org/officeDocument/2006/relationships" xmlns:p="http://schemas.openxmlformats.org/presentationml/2006/main">
+  <p:cSld>
+    <p:spTree>
+      <p:nvGrpSpPr>
+        <p:cNvPr id="1" name=""/>
+        <p:cNvGrpSpPr/>
+        <p:nvPr/>
+      </p:nvGrpSpPr>
+      <p:grpSpPr>
+        <a:xfrm>
+          <a:off x="0" y="0"/>
+          <a:ext cx="0" cy="0"/>
+          <a:chOff x="0" y="0"/>
+          <a:chExt cx="0" cy="0"/>
+        </a:xfrm>
+      </p:grpSpPr>
+      <p:sp>
+        <p:nvSpPr>
+          <p:cNvPr id="2" name="Title 1">
+            <a:extLst>
+              <a:ext uri="{FF2B5EF4-FFF2-40B4-BE49-F238E27FC236}">
+                <a16:creationId xmlns:a16="http://schemas.microsoft.com/office/drawing/2014/main" id="{C02CE360-8D0B-E847-A79E-D392EEE720AB}"/>
+              </a:ext>
+            </a:extLst>
+          </p:cNvPr>
+          <p:cNvSpPr>
+            <a:spLocks noGrp="1"/>
+          </p:cNvSpPr>
+          <p:nvPr>
+            <p:ph type="title"/>
+          </p:nvPr>
+        </p:nvSpPr>
+        <p:spPr/>
+        <p:txBody>
+          <a:bodyPr/>
+          <a:lstStyle/>
+          <a:p>
+            <a:r>
+              <a:rPr lang="en-US" dirty="0"/>
+              <a:t>The System Dynamics Approach</a:t>
+            </a:r>
+          </a:p>
+        </p:txBody>
+      </p:sp>
+      <p:pic>
+        <p:nvPicPr>
+          <p:cNvPr id="8" name="Content Placeholder 7">
+            <a:extLst>
+              <a:ext uri="{FF2B5EF4-FFF2-40B4-BE49-F238E27FC236}">
+                <a16:creationId xmlns:a16="http://schemas.microsoft.com/office/drawing/2014/main" id="{E72729CD-9678-B74B-B97D-F1B8FBFEC1A0}"/>
+              </a:ext>
+            </a:extLst>
+          </p:cNvPr>
+          <p:cNvPicPr>
+            <a:picLocks noGrp="1" noChangeAspect="1"/>
+          </p:cNvPicPr>
+          <p:nvPr>
+            <p:ph idx="1"/>
+          </p:nvPr>
+        </p:nvPicPr>
+        <p:blipFill>
+          <a:blip r:embed="rId2"/>
+          <a:stretch>
+            <a:fillRect/>
+          </a:stretch>
+        </p:blipFill>
+        <p:spPr>
+          <a:xfrm>
+            <a:off x="0" y="2029356"/>
+            <a:ext cx="7217869" cy="3112706"/>
+          </a:xfrm>
+        </p:spPr>
+      </p:pic>
+      <p:sp>
+        <p:nvSpPr>
+          <p:cNvPr id="4" name="TextBox 3">
+            <a:extLst>
+              <a:ext uri="{FF2B5EF4-FFF2-40B4-BE49-F238E27FC236}">
+                <a16:creationId xmlns:a16="http://schemas.microsoft.com/office/drawing/2014/main" id="{54C4DA94-05EA-D241-9790-F73B33E10075}"/>
+              </a:ext>
+            </a:extLst>
+          </p:cNvPr>
+          <p:cNvSpPr txBox="1"/>
+          <p:nvPr/>
+        </p:nvSpPr>
+        <p:spPr>
+          <a:xfrm>
+            <a:off x="265453" y="6223007"/>
+            <a:ext cx="6952416" cy="369332"/>
+          </a:xfrm>
+          <a:prstGeom prst="rect">
+            <a:avLst/>
+          </a:prstGeom>
+          <a:noFill/>
+        </p:spPr>
+        <p:txBody>
+          <a:bodyPr wrap="none" rtlCol="0">
+            <a:spAutoFit/>
+          </a:bodyPr>
+          <a:lstStyle/>
+          <a:p>
+            <a:r>
+              <a:rPr lang="en-US" dirty="0"/>
+              <a:t>Figure 11.9: System Dynamics process (source: </a:t>
+            </a:r>
+            <a:r>
+              <a:rPr lang="en-US" dirty="0" err="1"/>
+              <a:t>Shiflet</a:t>
+            </a:r>
+            <a:r>
+              <a:rPr lang="en-US" dirty="0"/>
+              <a:t> and </a:t>
+            </a:r>
+            <a:r>
+              <a:rPr lang="en-US" dirty="0" err="1"/>
+              <a:t>Shiflet</a:t>
+            </a:r>
+            <a:r>
+              <a:rPr lang="en-US" dirty="0"/>
+              <a:t>, 2014).</a:t>
+            </a:r>
+          </a:p>
+        </p:txBody>
+      </p:sp>
+      <p:pic>
+        <p:nvPicPr>
+          <p:cNvPr id="10" name="Picture 9">
+            <a:extLst>
+              <a:ext uri="{FF2B5EF4-FFF2-40B4-BE49-F238E27FC236}">
+                <a16:creationId xmlns:a16="http://schemas.microsoft.com/office/drawing/2014/main" id="{8686454E-1403-5347-BAD9-87D1F5180F69}"/>
+              </a:ext>
+            </a:extLst>
+          </p:cNvPr>
+          <p:cNvPicPr>
+            <a:picLocks noChangeAspect="1"/>
+          </p:cNvPicPr>
+          <p:nvPr/>
+        </p:nvPicPr>
+        <p:blipFill>
+          <a:blip r:embed="rId3"/>
+          <a:stretch>
+            <a:fillRect/>
+          </a:stretch>
+        </p:blipFill>
+        <p:spPr>
+          <a:xfrm>
+            <a:off x="7426549" y="1690688"/>
+            <a:ext cx="4375984" cy="4193651"/>
+          </a:xfrm>
+          <a:prstGeom prst="rect">
+            <a:avLst/>
+          </a:prstGeom>
+        </p:spPr>
+      </p:pic>
+      <p:sp>
+        <p:nvSpPr>
+          <p:cNvPr id="11" name="TextBox 10">
+            <a:extLst>
+              <a:ext uri="{FF2B5EF4-FFF2-40B4-BE49-F238E27FC236}">
+                <a16:creationId xmlns:a16="http://schemas.microsoft.com/office/drawing/2014/main" id="{7113A459-1E41-E544-B6A0-8543F448B0D0}"/>
+              </a:ext>
+            </a:extLst>
+          </p:cNvPr>
+          <p:cNvSpPr txBox="1"/>
+          <p:nvPr/>
+        </p:nvSpPr>
+        <p:spPr>
+          <a:xfrm>
+            <a:off x="7713080" y="6228279"/>
+            <a:ext cx="4089453" cy="369332"/>
+          </a:xfrm>
+          <a:prstGeom prst="rect">
+            <a:avLst/>
+          </a:prstGeom>
+          <a:noFill/>
+        </p:spPr>
+        <p:txBody>
+          <a:bodyPr wrap="none" rtlCol="0">
+            <a:spAutoFit/>
+          </a:bodyPr>
+          <a:lstStyle/>
+          <a:p>
+            <a:r>
+              <a:rPr lang="en-US" dirty="0"/>
+              <a:t>Figure 11.10: System Dynamics flowchart.</a:t>
+            </a:r>
+          </a:p>
+        </p:txBody>
+      </p:sp>
+    </p:spTree>
+    <p:extLst>
+      <p:ext uri="{BB962C8B-B14F-4D97-AF65-F5344CB8AC3E}">
+        <p14:creationId xmlns:p14="http://schemas.microsoft.com/office/powerpoint/2010/main" val="166052398"/>
+      </p:ext>
+    </p:extLst>
+  </p:cSld>
+  <p:clrMapOvr>
+    <a:masterClrMapping/>
+  </p:clrMapOvr>
+</p:sld>
+</file>
+
 <file path=ppt/slides/slide2.xml><?xml version="1.0" encoding="utf-8"?>
 <p:sld xmlns:a="http://schemas.openxmlformats.org/drawingml/2006/main" xmlns:r="http://schemas.openxmlformats.org/officeDocument/2006/relationships" xmlns:p="http://schemas.openxmlformats.org/presentationml/2006/main">
   <p:cSld>
@@ -4766,6 +5327,905 @@
     <p:extLst>
       <p:ext uri="{BB962C8B-B14F-4D97-AF65-F5344CB8AC3E}">
         <p14:creationId xmlns:p14="http://schemas.microsoft.com/office/powerpoint/2010/main" val="2975991200"/>
+      </p:ext>
+    </p:extLst>
+  </p:cSld>
+  <p:clrMapOvr>
+    <a:masterClrMapping/>
+  </p:clrMapOvr>
+</p:sld>
+</file>
+
+<file path=ppt/slides/slide20.xml><?xml version="1.0" encoding="utf-8"?>
+<p:sld xmlns:a="http://schemas.openxmlformats.org/drawingml/2006/main" xmlns:r="http://schemas.openxmlformats.org/officeDocument/2006/relationships" xmlns:p="http://schemas.openxmlformats.org/presentationml/2006/main">
+  <p:cSld>
+    <p:spTree>
+      <p:nvGrpSpPr>
+        <p:cNvPr id="1" name=""/>
+        <p:cNvGrpSpPr/>
+        <p:nvPr/>
+      </p:nvGrpSpPr>
+      <p:grpSpPr>
+        <a:xfrm>
+          <a:off x="0" y="0"/>
+          <a:ext cx="0" cy="0"/>
+          <a:chOff x="0" y="0"/>
+          <a:chExt cx="0" cy="0"/>
+        </a:xfrm>
+      </p:grpSpPr>
+      <p:sp>
+        <p:nvSpPr>
+          <p:cNvPr id="2" name="Title 1">
+            <a:extLst>
+              <a:ext uri="{FF2B5EF4-FFF2-40B4-BE49-F238E27FC236}">
+                <a16:creationId xmlns:a16="http://schemas.microsoft.com/office/drawing/2014/main" id="{09C3ABAD-2037-0841-93C1-FBACBFF2D903}"/>
+              </a:ext>
+            </a:extLst>
+          </p:cNvPr>
+          <p:cNvSpPr>
+            <a:spLocks noGrp="1"/>
+          </p:cNvSpPr>
+          <p:nvPr>
+            <p:ph type="title"/>
+          </p:nvPr>
+        </p:nvSpPr>
+        <p:spPr/>
+        <p:txBody>
+          <a:bodyPr/>
+          <a:lstStyle/>
+          <a:p>
+            <a:r>
+              <a:rPr lang="en-US" dirty="0"/>
+              <a:t>The Agent-Based Approach</a:t>
+            </a:r>
+          </a:p>
+        </p:txBody>
+      </p:sp>
+      <p:pic>
+        <p:nvPicPr>
+          <p:cNvPr id="5" name="Content Placeholder 4">
+            <a:extLst>
+              <a:ext uri="{FF2B5EF4-FFF2-40B4-BE49-F238E27FC236}">
+                <a16:creationId xmlns:a16="http://schemas.microsoft.com/office/drawing/2014/main" id="{3E24583D-6C70-F54E-9C47-9E655DF50DEE}"/>
+              </a:ext>
+            </a:extLst>
+          </p:cNvPr>
+          <p:cNvPicPr>
+            <a:picLocks noGrp="1" noChangeAspect="1"/>
+          </p:cNvPicPr>
+          <p:nvPr>
+            <p:ph idx="1"/>
+          </p:nvPr>
+        </p:nvPicPr>
+        <p:blipFill>
+          <a:blip r:embed="rId2"/>
+          <a:stretch>
+            <a:fillRect/>
+          </a:stretch>
+        </p:blipFill>
+        <p:spPr>
+          <a:xfrm>
+            <a:off x="6942667" y="1645124"/>
+            <a:ext cx="4411133" cy="4297444"/>
+          </a:xfrm>
+        </p:spPr>
+      </p:pic>
+      <p:pic>
+        <p:nvPicPr>
+          <p:cNvPr id="7" name="Picture 6">
+            <a:extLst>
+              <a:ext uri="{FF2B5EF4-FFF2-40B4-BE49-F238E27FC236}">
+                <a16:creationId xmlns:a16="http://schemas.microsoft.com/office/drawing/2014/main" id="{0C6956EA-0EBD-DB4D-8DFF-4A374094BD81}"/>
+              </a:ext>
+            </a:extLst>
+          </p:cNvPr>
+          <p:cNvPicPr>
+            <a:picLocks noChangeAspect="1"/>
+          </p:cNvPicPr>
+          <p:nvPr/>
+        </p:nvPicPr>
+        <p:blipFill>
+          <a:blip r:embed="rId3"/>
+          <a:stretch>
+            <a:fillRect/>
+          </a:stretch>
+        </p:blipFill>
+        <p:spPr>
+          <a:xfrm>
+            <a:off x="1115623" y="1981212"/>
+            <a:ext cx="3856287" cy="3876691"/>
+          </a:xfrm>
+          <a:prstGeom prst="rect">
+            <a:avLst/>
+          </a:prstGeom>
+        </p:spPr>
+      </p:pic>
+      <p:sp>
+        <p:nvSpPr>
+          <p:cNvPr id="8" name="TextBox 7">
+            <a:extLst>
+              <a:ext uri="{FF2B5EF4-FFF2-40B4-BE49-F238E27FC236}">
+                <a16:creationId xmlns:a16="http://schemas.microsoft.com/office/drawing/2014/main" id="{D6A5FF00-364A-AF44-93B5-71E230ED99C2}"/>
+              </a:ext>
+            </a:extLst>
+          </p:cNvPr>
+          <p:cNvSpPr txBox="1"/>
+          <p:nvPr/>
+        </p:nvSpPr>
+        <p:spPr>
+          <a:xfrm>
+            <a:off x="6096000" y="5942568"/>
+            <a:ext cx="5930341" cy="369332"/>
+          </a:xfrm>
+          <a:prstGeom prst="rect">
+            <a:avLst/>
+          </a:prstGeom>
+          <a:noFill/>
+        </p:spPr>
+        <p:txBody>
+          <a:bodyPr wrap="none" rtlCol="0">
+            <a:spAutoFit/>
+          </a:bodyPr>
+          <a:lstStyle/>
+          <a:p>
+            <a:r>
+              <a:rPr lang="en-US" dirty="0"/>
+              <a:t>Figure 11.11: Agent-based Modelling: agent decision process.</a:t>
+            </a:r>
+          </a:p>
+        </p:txBody>
+      </p:sp>
+      <p:sp>
+        <p:nvSpPr>
+          <p:cNvPr id="9" name="TextBox 8">
+            <a:extLst>
+              <a:ext uri="{FF2B5EF4-FFF2-40B4-BE49-F238E27FC236}">
+                <a16:creationId xmlns:a16="http://schemas.microsoft.com/office/drawing/2014/main" id="{F18A823D-C56F-8240-96E9-77082E4ABA46}"/>
+              </a:ext>
+            </a:extLst>
+          </p:cNvPr>
+          <p:cNvSpPr txBox="1"/>
+          <p:nvPr/>
+        </p:nvSpPr>
+        <p:spPr>
+          <a:xfrm>
+            <a:off x="306916" y="5942568"/>
+            <a:ext cx="5789084" cy="646331"/>
+          </a:xfrm>
+          <a:prstGeom prst="rect">
+            <a:avLst/>
+          </a:prstGeom>
+          <a:noFill/>
+        </p:spPr>
+        <p:txBody>
+          <a:bodyPr wrap="square" rtlCol="0">
+            <a:spAutoFit/>
+          </a:bodyPr>
+          <a:lstStyle/>
+          <a:p>
+            <a:pPr algn="ctr"/>
+            <a:r>
+              <a:rPr lang="en-US" dirty="0"/>
+              <a:t>Figure 11.12: Display of the agent-based model. </a:t>
+            </a:r>
+            <a:r>
+              <a:rPr lang="en-US" dirty="0">
+                <a:solidFill>
+                  <a:schemeClr val="accent6"/>
+                </a:solidFill>
+              </a:rPr>
+              <a:t>Green</a:t>
+            </a:r>
+            <a:r>
+              <a:rPr lang="en-US" dirty="0"/>
+              <a:t> = susceptible. </a:t>
+            </a:r>
+            <a:r>
+              <a:rPr lang="en-US" dirty="0">
+                <a:solidFill>
+                  <a:srgbClr val="FF0000"/>
+                </a:solidFill>
+              </a:rPr>
+              <a:t>Red</a:t>
+            </a:r>
+            <a:r>
+              <a:rPr lang="en-US" dirty="0"/>
+              <a:t> = infected. </a:t>
+            </a:r>
+            <a:r>
+              <a:rPr lang="en-US" dirty="0">
+                <a:solidFill>
+                  <a:schemeClr val="accent1"/>
+                </a:solidFill>
+              </a:rPr>
+              <a:t>Blue</a:t>
+            </a:r>
+            <a:r>
+              <a:rPr lang="en-US" dirty="0"/>
+              <a:t> = recovered.</a:t>
+            </a:r>
+          </a:p>
+        </p:txBody>
+      </p:sp>
+    </p:spTree>
+    <p:extLst>
+      <p:ext uri="{BB962C8B-B14F-4D97-AF65-F5344CB8AC3E}">
+        <p14:creationId xmlns:p14="http://schemas.microsoft.com/office/powerpoint/2010/main" val="1525783580"/>
+      </p:ext>
+    </p:extLst>
+  </p:cSld>
+  <p:clrMapOvr>
+    <a:masterClrMapping/>
+  </p:clrMapOvr>
+</p:sld>
+</file>
+
+<file path=ppt/slides/slide21.xml><?xml version="1.0" encoding="utf-8"?>
+<p:sld xmlns:a="http://schemas.openxmlformats.org/drawingml/2006/main" xmlns:r="http://schemas.openxmlformats.org/officeDocument/2006/relationships" xmlns:p="http://schemas.openxmlformats.org/presentationml/2006/main">
+  <p:cSld>
+    <p:spTree>
+      <p:nvGrpSpPr>
+        <p:cNvPr id="1" name=""/>
+        <p:cNvGrpSpPr/>
+        <p:nvPr/>
+      </p:nvGrpSpPr>
+      <p:grpSpPr>
+        <a:xfrm>
+          <a:off x="0" y="0"/>
+          <a:ext cx="0" cy="0"/>
+          <a:chOff x="0" y="0"/>
+          <a:chExt cx="0" cy="0"/>
+        </a:xfrm>
+      </p:grpSpPr>
+      <p:sp>
+        <p:nvSpPr>
+          <p:cNvPr id="2" name="Title 1">
+            <a:extLst>
+              <a:ext uri="{FF2B5EF4-FFF2-40B4-BE49-F238E27FC236}">
+                <a16:creationId xmlns:a16="http://schemas.microsoft.com/office/drawing/2014/main" id="{CEE09C3D-407D-A047-82D4-0618AA96230E}"/>
+              </a:ext>
+            </a:extLst>
+          </p:cNvPr>
+          <p:cNvSpPr>
+            <a:spLocks noGrp="1"/>
+          </p:cNvSpPr>
+          <p:nvPr>
+            <p:ph type="title"/>
+          </p:nvPr>
+        </p:nvSpPr>
+        <p:spPr/>
+        <p:txBody>
+          <a:bodyPr/>
+          <a:lstStyle/>
+          <a:p>
+            <a:r>
+              <a:rPr lang="en-US" dirty="0"/>
+              <a:t>The Cellular Automata Approach</a:t>
+            </a:r>
+          </a:p>
+        </p:txBody>
+      </p:sp>
+      <p:pic>
+        <p:nvPicPr>
+          <p:cNvPr id="5" name="Content Placeholder 4">
+            <a:extLst>
+              <a:ext uri="{FF2B5EF4-FFF2-40B4-BE49-F238E27FC236}">
+                <a16:creationId xmlns:a16="http://schemas.microsoft.com/office/drawing/2014/main" id="{08BEBB82-FA00-E649-8853-EA1C388C0334}"/>
+              </a:ext>
+            </a:extLst>
+          </p:cNvPr>
+          <p:cNvPicPr>
+            <a:picLocks noGrp="1" noChangeAspect="1"/>
+          </p:cNvPicPr>
+          <p:nvPr>
+            <p:ph idx="1"/>
+          </p:nvPr>
+        </p:nvPicPr>
+        <p:blipFill>
+          <a:blip r:embed="rId3"/>
+          <a:stretch>
+            <a:fillRect/>
+          </a:stretch>
+        </p:blipFill>
+        <p:spPr>
+          <a:xfrm>
+            <a:off x="1126067" y="1690688"/>
+            <a:ext cx="3733800" cy="3733800"/>
+          </a:xfrm>
+        </p:spPr>
+      </p:pic>
+      <p:pic>
+        <p:nvPicPr>
+          <p:cNvPr id="7" name="Picture 6">
+            <a:extLst>
+              <a:ext uri="{FF2B5EF4-FFF2-40B4-BE49-F238E27FC236}">
+                <a16:creationId xmlns:a16="http://schemas.microsoft.com/office/drawing/2014/main" id="{79D6D241-5531-D641-8612-3C0E200AC318}"/>
+              </a:ext>
+            </a:extLst>
+          </p:cNvPr>
+          <p:cNvPicPr>
+            <a:picLocks noChangeAspect="1"/>
+          </p:cNvPicPr>
+          <p:nvPr/>
+        </p:nvPicPr>
+        <p:blipFill>
+          <a:blip r:embed="rId4"/>
+          <a:stretch>
+            <a:fillRect/>
+          </a:stretch>
+        </p:blipFill>
+        <p:spPr>
+          <a:xfrm>
+            <a:off x="5873116" y="1918891"/>
+            <a:ext cx="5480684" cy="3277394"/>
+          </a:xfrm>
+          <a:prstGeom prst="rect">
+            <a:avLst/>
+          </a:prstGeom>
+        </p:spPr>
+      </p:pic>
+      <p:sp>
+        <p:nvSpPr>
+          <p:cNvPr id="8" name="TextBox 7">
+            <a:extLst>
+              <a:ext uri="{FF2B5EF4-FFF2-40B4-BE49-F238E27FC236}">
+                <a16:creationId xmlns:a16="http://schemas.microsoft.com/office/drawing/2014/main" id="{61B1DFFB-13F1-A440-97D4-ED78739FF33D}"/>
+              </a:ext>
+            </a:extLst>
+          </p:cNvPr>
+          <p:cNvSpPr txBox="1"/>
+          <p:nvPr/>
+        </p:nvSpPr>
+        <p:spPr>
+          <a:xfrm>
+            <a:off x="6299200" y="5926667"/>
+            <a:ext cx="5245860" cy="369332"/>
+          </a:xfrm>
+          <a:prstGeom prst="rect">
+            <a:avLst/>
+          </a:prstGeom>
+          <a:noFill/>
+        </p:spPr>
+        <p:txBody>
+          <a:bodyPr wrap="none" rtlCol="0">
+            <a:spAutoFit/>
+          </a:bodyPr>
+          <a:lstStyle/>
+          <a:p>
+            <a:r>
+              <a:rPr lang="en-US" dirty="0"/>
+              <a:t>Figure 11.13: Cellular Automata cell changing process.</a:t>
+            </a:r>
+          </a:p>
+        </p:txBody>
+      </p:sp>
+      <p:sp>
+        <p:nvSpPr>
+          <p:cNvPr id="9" name="TextBox 8">
+            <a:extLst>
+              <a:ext uri="{FF2B5EF4-FFF2-40B4-BE49-F238E27FC236}">
+                <a16:creationId xmlns:a16="http://schemas.microsoft.com/office/drawing/2014/main" id="{AF59D7E5-FFE5-0240-832B-1B22E90DB4D6}"/>
+              </a:ext>
+            </a:extLst>
+          </p:cNvPr>
+          <p:cNvSpPr txBox="1"/>
+          <p:nvPr/>
+        </p:nvSpPr>
+        <p:spPr>
+          <a:xfrm>
+            <a:off x="478367" y="5788167"/>
+            <a:ext cx="5029200" cy="646331"/>
+          </a:xfrm>
+          <a:prstGeom prst="rect">
+            <a:avLst/>
+          </a:prstGeom>
+          <a:noFill/>
+        </p:spPr>
+        <p:txBody>
+          <a:bodyPr wrap="square" rtlCol="0">
+            <a:spAutoFit/>
+          </a:bodyPr>
+          <a:lstStyle/>
+          <a:p>
+            <a:pPr algn="ctr"/>
+            <a:r>
+              <a:rPr lang="en-US" dirty="0"/>
+              <a:t>Figure 11.14: Display of the CA model. </a:t>
+            </a:r>
+            <a:r>
+              <a:rPr lang="en-US" dirty="0">
+                <a:solidFill>
+                  <a:schemeClr val="accent6"/>
+                </a:solidFill>
+              </a:rPr>
+              <a:t>Green</a:t>
+            </a:r>
+            <a:r>
+              <a:rPr lang="en-US" dirty="0"/>
+              <a:t> = susceptible. </a:t>
+            </a:r>
+            <a:r>
+              <a:rPr lang="en-US" dirty="0">
+                <a:solidFill>
+                  <a:srgbClr val="FF0000"/>
+                </a:solidFill>
+              </a:rPr>
+              <a:t>Red</a:t>
+            </a:r>
+            <a:r>
+              <a:rPr lang="en-US" dirty="0"/>
+              <a:t> = infected. </a:t>
+            </a:r>
+            <a:r>
+              <a:rPr lang="en-US" dirty="0">
+                <a:solidFill>
+                  <a:schemeClr val="accent1"/>
+                </a:solidFill>
+              </a:rPr>
+              <a:t>Blue</a:t>
+            </a:r>
+            <a:r>
+              <a:rPr lang="en-US" dirty="0"/>
+              <a:t> = recovered. </a:t>
+            </a:r>
+          </a:p>
+        </p:txBody>
+      </p:sp>
+    </p:spTree>
+    <p:extLst>
+      <p:ext uri="{BB962C8B-B14F-4D97-AF65-F5344CB8AC3E}">
+        <p14:creationId xmlns:p14="http://schemas.microsoft.com/office/powerpoint/2010/main" val="4134120436"/>
+      </p:ext>
+    </p:extLst>
+  </p:cSld>
+  <p:clrMapOvr>
+    <a:masterClrMapping/>
+  </p:clrMapOvr>
+</p:sld>
+</file>
+
+<file path=ppt/slides/slide22.xml><?xml version="1.0" encoding="utf-8"?>
+<p:sld xmlns:a="http://schemas.openxmlformats.org/drawingml/2006/main" xmlns:r="http://schemas.openxmlformats.org/officeDocument/2006/relationships" xmlns:p="http://schemas.openxmlformats.org/presentationml/2006/main">
+  <p:cSld>
+    <p:spTree>
+      <p:nvGrpSpPr>
+        <p:cNvPr id="1" name=""/>
+        <p:cNvGrpSpPr/>
+        <p:nvPr/>
+      </p:nvGrpSpPr>
+      <p:grpSpPr>
+        <a:xfrm>
+          <a:off x="0" y="0"/>
+          <a:ext cx="0" cy="0"/>
+          <a:chOff x="0" y="0"/>
+          <a:chExt cx="0" cy="0"/>
+        </a:xfrm>
+      </p:grpSpPr>
+      <p:sp>
+        <p:nvSpPr>
+          <p:cNvPr id="2" name="Title 1">
+            <a:extLst>
+              <a:ext uri="{FF2B5EF4-FFF2-40B4-BE49-F238E27FC236}">
+                <a16:creationId xmlns:a16="http://schemas.microsoft.com/office/drawing/2014/main" id="{388F3260-07B3-EE4D-AB8E-2D9C1C1B41CF}"/>
+              </a:ext>
+            </a:extLst>
+          </p:cNvPr>
+          <p:cNvSpPr>
+            <a:spLocks noGrp="1"/>
+          </p:cNvSpPr>
+          <p:nvPr>
+            <p:ph type="title"/>
+          </p:nvPr>
+        </p:nvSpPr>
+        <p:spPr/>
+        <p:txBody>
+          <a:bodyPr/>
+          <a:lstStyle/>
+          <a:p>
+            <a:r>
+              <a:rPr lang="en-US" dirty="0"/>
+              <a:t>The Discrete Event Simulation Approach</a:t>
+            </a:r>
+          </a:p>
+        </p:txBody>
+      </p:sp>
+      <p:pic>
+        <p:nvPicPr>
+          <p:cNvPr id="5" name="Content Placeholder 4">
+            <a:extLst>
+              <a:ext uri="{FF2B5EF4-FFF2-40B4-BE49-F238E27FC236}">
+                <a16:creationId xmlns:a16="http://schemas.microsoft.com/office/drawing/2014/main" id="{D8687AC3-59E4-AC4E-88C1-76E43C1E11EE}"/>
+              </a:ext>
+            </a:extLst>
+          </p:cNvPr>
+          <p:cNvPicPr>
+            <a:picLocks noGrp="1" noChangeAspect="1"/>
+          </p:cNvPicPr>
+          <p:nvPr>
+            <p:ph idx="1"/>
+          </p:nvPr>
+        </p:nvPicPr>
+        <p:blipFill>
+          <a:blip r:embed="rId2"/>
+          <a:stretch>
+            <a:fillRect/>
+          </a:stretch>
+        </p:blipFill>
+        <p:spPr>
+          <a:xfrm>
+            <a:off x="1016000" y="3150394"/>
+            <a:ext cx="10160000" cy="1701800"/>
+          </a:xfrm>
+        </p:spPr>
+      </p:pic>
+      <p:sp>
+        <p:nvSpPr>
+          <p:cNvPr id="6" name="TextBox 5">
+            <a:extLst>
+              <a:ext uri="{FF2B5EF4-FFF2-40B4-BE49-F238E27FC236}">
+                <a16:creationId xmlns:a16="http://schemas.microsoft.com/office/drawing/2014/main" id="{C1314FE6-1B42-EC4E-8128-147AF363038C}"/>
+              </a:ext>
+            </a:extLst>
+          </p:cNvPr>
+          <p:cNvSpPr txBox="1"/>
+          <p:nvPr/>
+        </p:nvSpPr>
+        <p:spPr>
+          <a:xfrm>
+            <a:off x="3762797" y="5469467"/>
+            <a:ext cx="4666406" cy="369332"/>
+          </a:xfrm>
+          <a:prstGeom prst="rect">
+            <a:avLst/>
+          </a:prstGeom>
+          <a:noFill/>
+        </p:spPr>
+        <p:txBody>
+          <a:bodyPr wrap="none" rtlCol="0">
+            <a:spAutoFit/>
+          </a:bodyPr>
+          <a:lstStyle/>
+          <a:p>
+            <a:r>
+              <a:rPr lang="en-US" dirty="0"/>
+              <a:t>Figure 11.15: Discrete event simulation process.</a:t>
+            </a:r>
+          </a:p>
+        </p:txBody>
+      </p:sp>
+    </p:spTree>
+    <p:extLst>
+      <p:ext uri="{BB962C8B-B14F-4D97-AF65-F5344CB8AC3E}">
+        <p14:creationId xmlns:p14="http://schemas.microsoft.com/office/powerpoint/2010/main" val="1977143938"/>
+      </p:ext>
+    </p:extLst>
+  </p:cSld>
+  <p:clrMapOvr>
+    <a:masterClrMapping/>
+  </p:clrMapOvr>
+</p:sld>
+</file>
+
+<file path=ppt/slides/slide23.xml><?xml version="1.0" encoding="utf-8"?>
+<p:sld xmlns:a="http://schemas.openxmlformats.org/drawingml/2006/main" xmlns:r="http://schemas.openxmlformats.org/officeDocument/2006/relationships" xmlns:p="http://schemas.openxmlformats.org/presentationml/2006/main">
+  <p:cSld>
+    <p:spTree>
+      <p:nvGrpSpPr>
+        <p:cNvPr id="1" name=""/>
+        <p:cNvGrpSpPr/>
+        <p:nvPr/>
+      </p:nvGrpSpPr>
+      <p:grpSpPr>
+        <a:xfrm>
+          <a:off x="0" y="0"/>
+          <a:ext cx="0" cy="0"/>
+          <a:chOff x="0" y="0"/>
+          <a:chExt cx="0" cy="0"/>
+        </a:xfrm>
+      </p:grpSpPr>
+      <p:sp>
+        <p:nvSpPr>
+          <p:cNvPr id="2" name="Title 1">
+            <a:extLst>
+              <a:ext uri="{FF2B5EF4-FFF2-40B4-BE49-F238E27FC236}">
+                <a16:creationId xmlns:a16="http://schemas.microsoft.com/office/drawing/2014/main" id="{42B7F3A7-607A-A045-BE7F-7D2624B06848}"/>
+              </a:ext>
+            </a:extLst>
+          </p:cNvPr>
+          <p:cNvSpPr>
+            <a:spLocks noGrp="1"/>
+          </p:cNvSpPr>
+          <p:nvPr>
+            <p:ph type="title"/>
+          </p:nvPr>
+        </p:nvSpPr>
+        <p:spPr/>
+        <p:txBody>
+          <a:bodyPr/>
+          <a:lstStyle/>
+          <a:p>
+            <a:r>
+              <a:rPr lang="en-US" dirty="0"/>
+              <a:t>Comparative Analysis</a:t>
+            </a:r>
+          </a:p>
+        </p:txBody>
+      </p:sp>
+      <p:pic>
+        <p:nvPicPr>
+          <p:cNvPr id="5" name="Content Placeholder 4">
+            <a:extLst>
+              <a:ext uri="{FF2B5EF4-FFF2-40B4-BE49-F238E27FC236}">
+                <a16:creationId xmlns:a16="http://schemas.microsoft.com/office/drawing/2014/main" id="{F01EBA6C-6FFE-5F41-9504-1B2340ED1D69}"/>
+              </a:ext>
+            </a:extLst>
+          </p:cNvPr>
+          <p:cNvPicPr>
+            <a:picLocks noGrp="1" noChangeAspect="1"/>
+          </p:cNvPicPr>
+          <p:nvPr>
+            <p:ph idx="1"/>
+          </p:nvPr>
+        </p:nvPicPr>
+        <p:blipFill>
+          <a:blip r:embed="rId2"/>
+          <a:stretch>
+            <a:fillRect/>
+          </a:stretch>
+        </p:blipFill>
+        <p:spPr>
+          <a:xfrm>
+            <a:off x="2249424" y="2066544"/>
+            <a:ext cx="7688462" cy="3867912"/>
+          </a:xfrm>
+        </p:spPr>
+      </p:pic>
+      <p:sp>
+        <p:nvSpPr>
+          <p:cNvPr id="6" name="TextBox 5">
+            <a:extLst>
+              <a:ext uri="{FF2B5EF4-FFF2-40B4-BE49-F238E27FC236}">
+                <a16:creationId xmlns:a16="http://schemas.microsoft.com/office/drawing/2014/main" id="{577CE5F4-C251-844B-BBC1-D25CE7C6E451}"/>
+              </a:ext>
+            </a:extLst>
+          </p:cNvPr>
+          <p:cNvSpPr txBox="1"/>
+          <p:nvPr/>
+        </p:nvSpPr>
+        <p:spPr>
+          <a:xfrm>
+            <a:off x="838200" y="6311900"/>
+            <a:ext cx="10868424" cy="369332"/>
+          </a:xfrm>
+          <a:prstGeom prst="rect">
+            <a:avLst/>
+          </a:prstGeom>
+          <a:noFill/>
+        </p:spPr>
+        <p:txBody>
+          <a:bodyPr wrap="none" rtlCol="0">
+            <a:spAutoFit/>
+          </a:bodyPr>
+          <a:lstStyle/>
+          <a:p>
+            <a:r>
+              <a:rPr lang="en-US" dirty="0"/>
+              <a:t>Figure 11.16: Results for the different models. Clockwise from top left: SD model, agent-based model, DES and CA.</a:t>
+            </a:r>
+          </a:p>
+        </p:txBody>
+      </p:sp>
+    </p:spTree>
+    <p:extLst>
+      <p:ext uri="{BB962C8B-B14F-4D97-AF65-F5344CB8AC3E}">
+        <p14:creationId xmlns:p14="http://schemas.microsoft.com/office/powerpoint/2010/main" val="1270752764"/>
+      </p:ext>
+    </p:extLst>
+  </p:cSld>
+  <p:clrMapOvr>
+    <a:masterClrMapping/>
+  </p:clrMapOvr>
+</p:sld>
+</file>
+
+<file path=ppt/slides/slide24.xml><?xml version="1.0" encoding="utf-8"?>
+<p:sld xmlns:a="http://schemas.openxmlformats.org/drawingml/2006/main" xmlns:r="http://schemas.openxmlformats.org/officeDocument/2006/relationships" xmlns:p="http://schemas.openxmlformats.org/presentationml/2006/main">
+  <p:cSld>
+    <p:spTree>
+      <p:nvGrpSpPr>
+        <p:cNvPr id="1" name=""/>
+        <p:cNvGrpSpPr/>
+        <p:nvPr/>
+      </p:nvGrpSpPr>
+      <p:grpSpPr>
+        <a:xfrm>
+          <a:off x="0" y="0"/>
+          <a:ext cx="0" cy="0"/>
+          <a:chOff x="0" y="0"/>
+          <a:chExt cx="0" cy="0"/>
+        </a:xfrm>
+      </p:grpSpPr>
+      <p:sp>
+        <p:nvSpPr>
+          <p:cNvPr id="2" name="Title 1">
+            <a:extLst>
+              <a:ext uri="{FF2B5EF4-FFF2-40B4-BE49-F238E27FC236}">
+                <a16:creationId xmlns:a16="http://schemas.microsoft.com/office/drawing/2014/main" id="{42B7F3A7-607A-A045-BE7F-7D2624B06848}"/>
+              </a:ext>
+            </a:extLst>
+          </p:cNvPr>
+          <p:cNvSpPr>
+            <a:spLocks noGrp="1"/>
+          </p:cNvSpPr>
+          <p:nvPr>
+            <p:ph type="title"/>
+          </p:nvPr>
+        </p:nvSpPr>
+        <p:spPr/>
+        <p:txBody>
+          <a:bodyPr/>
+          <a:lstStyle/>
+          <a:p>
+            <a:r>
+              <a:rPr lang="en-US" dirty="0"/>
+              <a:t>Comparative Analysis</a:t>
+            </a:r>
+          </a:p>
+        </p:txBody>
+      </p:sp>
+      <p:sp>
+        <p:nvSpPr>
+          <p:cNvPr id="6" name="TextBox 5">
+            <a:extLst>
+              <a:ext uri="{FF2B5EF4-FFF2-40B4-BE49-F238E27FC236}">
+                <a16:creationId xmlns:a16="http://schemas.microsoft.com/office/drawing/2014/main" id="{577CE5F4-C251-844B-BBC1-D25CE7C6E451}"/>
+              </a:ext>
+            </a:extLst>
+          </p:cNvPr>
+          <p:cNvSpPr txBox="1"/>
+          <p:nvPr/>
+        </p:nvSpPr>
+        <p:spPr>
+          <a:xfrm>
+            <a:off x="245532" y="6211669"/>
+            <a:ext cx="11700933" cy="646331"/>
+          </a:xfrm>
+          <a:prstGeom prst="rect">
+            <a:avLst/>
+          </a:prstGeom>
+          <a:noFill/>
+        </p:spPr>
+        <p:txBody>
+          <a:bodyPr wrap="square" rtlCol="0">
+            <a:spAutoFit/>
+          </a:bodyPr>
+          <a:lstStyle/>
+          <a:p>
+            <a:pPr algn="ctr"/>
+            <a:r>
+              <a:rPr lang="en-US" dirty="0"/>
+              <a:t>Figure 11.17: Results for the different models with infection rate = 0.02. Clockwise from top left: SD model, agent-based model, DES and CA.</a:t>
+            </a:r>
+          </a:p>
+        </p:txBody>
+      </p:sp>
+      <p:pic>
+        <p:nvPicPr>
+          <p:cNvPr id="8" name="Content Placeholder 7">
+            <a:extLst>
+              <a:ext uri="{FF2B5EF4-FFF2-40B4-BE49-F238E27FC236}">
+                <a16:creationId xmlns:a16="http://schemas.microsoft.com/office/drawing/2014/main" id="{9D164AE6-DBEB-CD46-B920-6F70E3105C47}"/>
+              </a:ext>
+            </a:extLst>
+          </p:cNvPr>
+          <p:cNvPicPr>
+            <a:picLocks noGrp="1" noChangeAspect="1"/>
+          </p:cNvPicPr>
+          <p:nvPr>
+            <p:ph idx="1"/>
+          </p:nvPr>
+        </p:nvPicPr>
+        <p:blipFill>
+          <a:blip r:embed="rId2"/>
+          <a:stretch>
+            <a:fillRect/>
+          </a:stretch>
+        </p:blipFill>
+        <p:spPr>
+          <a:xfrm>
+            <a:off x="2249424" y="2066544"/>
+            <a:ext cx="7581108" cy="3867912"/>
+          </a:xfrm>
+        </p:spPr>
+      </p:pic>
+    </p:spTree>
+    <p:extLst>
+      <p:ext uri="{BB962C8B-B14F-4D97-AF65-F5344CB8AC3E}">
+        <p14:creationId xmlns:p14="http://schemas.microsoft.com/office/powerpoint/2010/main" val="2861851010"/>
+      </p:ext>
+    </p:extLst>
+  </p:cSld>
+  <p:clrMapOvr>
+    <a:masterClrMapping/>
+  </p:clrMapOvr>
+</p:sld>
+</file>
+
+<file path=ppt/slides/slide25.xml><?xml version="1.0" encoding="utf-8"?>
+<p:sld xmlns:a="http://schemas.openxmlformats.org/drawingml/2006/main" xmlns:r="http://schemas.openxmlformats.org/officeDocument/2006/relationships" xmlns:p="http://schemas.openxmlformats.org/presentationml/2006/main">
+  <p:cSld>
+    <p:spTree>
+      <p:nvGrpSpPr>
+        <p:cNvPr id="1" name=""/>
+        <p:cNvGrpSpPr/>
+        <p:nvPr/>
+      </p:nvGrpSpPr>
+      <p:grpSpPr>
+        <a:xfrm>
+          <a:off x="0" y="0"/>
+          <a:ext cx="0" cy="0"/>
+          <a:chOff x="0" y="0"/>
+          <a:chExt cx="0" cy="0"/>
+        </a:xfrm>
+      </p:grpSpPr>
+      <p:sp>
+        <p:nvSpPr>
+          <p:cNvPr id="2" name="Title 1">
+            <a:extLst>
+              <a:ext uri="{FF2B5EF4-FFF2-40B4-BE49-F238E27FC236}">
+                <a16:creationId xmlns:a16="http://schemas.microsoft.com/office/drawing/2014/main" id="{95BD4439-907D-DA45-88C1-C3B0ABC159F0}"/>
+              </a:ext>
+            </a:extLst>
+          </p:cNvPr>
+          <p:cNvSpPr>
+            <a:spLocks noGrp="1"/>
+          </p:cNvSpPr>
+          <p:nvPr>
+            <p:ph type="title"/>
+          </p:nvPr>
+        </p:nvSpPr>
+        <p:spPr/>
+        <p:txBody>
+          <a:bodyPr/>
+          <a:lstStyle/>
+          <a:p>
+            <a:r>
+              <a:rPr lang="en-US" dirty="0" err="1"/>
+              <a:t>Disscssion</a:t>
+            </a:r>
+            <a:endParaRPr lang="en-US" dirty="0"/>
+          </a:p>
+        </p:txBody>
+      </p:sp>
+      <p:sp>
+        <p:nvSpPr>
+          <p:cNvPr id="3" name="Content Placeholder 2">
+            <a:extLst>
+              <a:ext uri="{FF2B5EF4-FFF2-40B4-BE49-F238E27FC236}">
+                <a16:creationId xmlns:a16="http://schemas.microsoft.com/office/drawing/2014/main" id="{17D1F25C-5795-4E41-9AA5-FBF1D4992FB0}"/>
+              </a:ext>
+            </a:extLst>
+          </p:cNvPr>
+          <p:cNvSpPr>
+            <a:spLocks noGrp="1"/>
+          </p:cNvSpPr>
+          <p:nvPr>
+            <p:ph idx="1"/>
+          </p:nvPr>
+        </p:nvSpPr>
+        <p:spPr/>
+        <p:txBody>
+          <a:bodyPr/>
+          <a:lstStyle/>
+          <a:p>
+            <a:endParaRPr lang="en-US"/>
+          </a:p>
+        </p:txBody>
+      </p:sp>
+    </p:spTree>
+    <p:extLst>
+      <p:ext uri="{BB962C8B-B14F-4D97-AF65-F5344CB8AC3E}">
+        <p14:creationId xmlns:p14="http://schemas.microsoft.com/office/powerpoint/2010/main" val="2222235188"/>
       </p:ext>
     </p:extLst>
   </p:cSld>

</xml_diff>